<commit_message>
Update sheets for Billy.
</commit_message>
<xml_diff>
--- a/pub/Wave_Resource_Numbers_Example.pptx
+++ b/pub/Wave_Resource_Numbers_Example.pptx
@@ -105,6 +105,11 @@
       </a:defRPr>
     </a:lvl9pPr>
   </p:defaultTextStyle>
+  <p:extLst>
+    <p:ext uri="{EFAFB233-063F-42B5-8137-9DF3F51BA10A}">
+      <p15:sldGuideLst xmlns:p15="http://schemas.microsoft.com/office/powerpoint/2012/main"/>
+    </p:ext>
+  </p:extLst>
 </p:presentation>
 </file>
 
@@ -255,7 +260,7 @@
           <a:p>
             <a:fld id="{56DE019C-0AE6-BF44-ABA2-5082EA104753}" type="datetimeFigureOut">
               <a:rPr lang="en-US" smtClean="0"/>
-              <a:t>12/27/21</a:t>
+              <a:t>5/9/22</a:t>
             </a:fld>
             <a:endParaRPr lang="en-US"/>
           </a:p>
@@ -453,7 +458,7 @@
           <a:p>
             <a:fld id="{56DE019C-0AE6-BF44-ABA2-5082EA104753}" type="datetimeFigureOut">
               <a:rPr lang="en-US" smtClean="0"/>
-              <a:t>12/27/21</a:t>
+              <a:t>5/9/22</a:t>
             </a:fld>
             <a:endParaRPr lang="en-US"/>
           </a:p>
@@ -661,7 +666,7 @@
           <a:p>
             <a:fld id="{56DE019C-0AE6-BF44-ABA2-5082EA104753}" type="datetimeFigureOut">
               <a:rPr lang="en-US" smtClean="0"/>
-              <a:t>12/27/21</a:t>
+              <a:t>5/9/22</a:t>
             </a:fld>
             <a:endParaRPr lang="en-US"/>
           </a:p>
@@ -859,7 +864,7 @@
           <a:p>
             <a:fld id="{56DE019C-0AE6-BF44-ABA2-5082EA104753}" type="datetimeFigureOut">
               <a:rPr lang="en-US" smtClean="0"/>
-              <a:t>12/27/21</a:t>
+              <a:t>5/9/22</a:t>
             </a:fld>
             <a:endParaRPr lang="en-US"/>
           </a:p>
@@ -1134,7 +1139,7 @@
           <a:p>
             <a:fld id="{56DE019C-0AE6-BF44-ABA2-5082EA104753}" type="datetimeFigureOut">
               <a:rPr lang="en-US" smtClean="0"/>
-              <a:t>12/27/21</a:t>
+              <a:t>5/9/22</a:t>
             </a:fld>
             <a:endParaRPr lang="en-US"/>
           </a:p>
@@ -1399,7 +1404,7 @@
           <a:p>
             <a:fld id="{56DE019C-0AE6-BF44-ABA2-5082EA104753}" type="datetimeFigureOut">
               <a:rPr lang="en-US" smtClean="0"/>
-              <a:t>12/27/21</a:t>
+              <a:t>5/9/22</a:t>
             </a:fld>
             <a:endParaRPr lang="en-US"/>
           </a:p>
@@ -1811,7 +1816,7 @@
           <a:p>
             <a:fld id="{56DE019C-0AE6-BF44-ABA2-5082EA104753}" type="datetimeFigureOut">
               <a:rPr lang="en-US" smtClean="0"/>
-              <a:t>12/27/21</a:t>
+              <a:t>5/9/22</a:t>
             </a:fld>
             <a:endParaRPr lang="en-US"/>
           </a:p>
@@ -1952,7 +1957,7 @@
           <a:p>
             <a:fld id="{56DE019C-0AE6-BF44-ABA2-5082EA104753}" type="datetimeFigureOut">
               <a:rPr lang="en-US" smtClean="0"/>
-              <a:t>12/27/21</a:t>
+              <a:t>5/9/22</a:t>
             </a:fld>
             <a:endParaRPr lang="en-US"/>
           </a:p>
@@ -2065,7 +2070,7 @@
           <a:p>
             <a:fld id="{56DE019C-0AE6-BF44-ABA2-5082EA104753}" type="datetimeFigureOut">
               <a:rPr lang="en-US" smtClean="0"/>
-              <a:t>12/27/21</a:t>
+              <a:t>5/9/22</a:t>
             </a:fld>
             <a:endParaRPr lang="en-US"/>
           </a:p>
@@ -2376,7 +2381,7 @@
           <a:p>
             <a:fld id="{56DE019C-0AE6-BF44-ABA2-5082EA104753}" type="datetimeFigureOut">
               <a:rPr lang="en-US" smtClean="0"/>
-              <a:t>12/27/21</a:t>
+              <a:t>5/9/22</a:t>
             </a:fld>
             <a:endParaRPr lang="en-US"/>
           </a:p>
@@ -2664,7 +2669,7 @@
           <a:p>
             <a:fld id="{56DE019C-0AE6-BF44-ABA2-5082EA104753}" type="datetimeFigureOut">
               <a:rPr lang="en-US" smtClean="0"/>
-              <a:t>12/27/21</a:t>
+              <a:t>5/9/22</a:t>
             </a:fld>
             <a:endParaRPr lang="en-US"/>
           </a:p>
@@ -2905,7 +2910,7 @@
           <a:p>
             <a:fld id="{56DE019C-0AE6-BF44-ABA2-5082EA104753}" type="datetimeFigureOut">
               <a:rPr lang="en-US" smtClean="0"/>
-              <a:t>12/27/21</a:t>
+              <a:t>5/9/22</a:t>
             </a:fld>
             <a:endParaRPr lang="en-US"/>
           </a:p>
@@ -3520,7 +3525,7 @@
             <a:lstStyle/>
             <a:p>
               <a:pPr algn="ctr"/>
-              <a:endParaRPr lang="en-US">
+              <a:endParaRPr lang="en-US" dirty="0">
                 <a:solidFill>
                   <a:schemeClr val="tx1"/>
                 </a:solidFill>
@@ -4725,7 +4730,7 @@
             <a:lstStyle/>
             <a:p>
               <a:pPr algn="ctr"/>
-              <a:endParaRPr lang="en-US">
+              <a:endParaRPr lang="en-US" dirty="0">
                 <a:solidFill>
                   <a:schemeClr val="tx1"/>
                 </a:solidFill>
@@ -5376,6 +5381,45 @@
           </a:fontRef>
         </p:style>
       </p:cxnSp>
+      <p:sp>
+        <p:nvSpPr>
+          <p:cNvPr id="2" name="TextBox 1">
+            <a:extLst>
+              <a:ext uri="{FF2B5EF4-FFF2-40B4-BE49-F238E27FC236}">
+                <a16:creationId xmlns:a16="http://schemas.microsoft.com/office/drawing/2014/main" id="{279E89E0-06F4-7FAF-34EC-3149AF8A3BB0}"/>
+              </a:ext>
+            </a:extLst>
+          </p:cNvPr>
+          <p:cNvSpPr txBox="1"/>
+          <p:nvPr/>
+        </p:nvSpPr>
+        <p:spPr>
+          <a:xfrm flipH="1">
+            <a:off x="419099" y="6196382"/>
+            <a:ext cx="3524043" cy="369332"/>
+          </a:xfrm>
+          <a:prstGeom prst="rect">
+            <a:avLst/>
+          </a:prstGeom>
+          <a:noFill/>
+        </p:spPr>
+        <p:txBody>
+          <a:bodyPr wrap="square" rtlCol="0">
+            <a:spAutoFit/>
+          </a:bodyPr>
+          <a:lstStyle/>
+          <a:p>
+            <a:r>
+              <a:rPr lang="en-US" dirty="0">
+                <a:solidFill>
+                  <a:srgbClr val="FF0000"/>
+                </a:solidFill>
+              </a:rPr>
+              <a:t>EXAMPLES – NOT TO SCALE</a:t>
+            </a:r>
+          </a:p>
+        </p:txBody>
+      </p:sp>
     </p:spTree>
     <p:extLst>
       <p:ext uri="{BB962C8B-B14F-4D97-AF65-F5344CB8AC3E}">
@@ -6101,6 +6145,320 @@
             <a:r>
               <a:rPr lang="en-US" dirty="0"/>
               <a:t>Add a bit of desaturation (transparency) to second circle colors.</a:t>
+            </a:r>
+          </a:p>
+        </p:txBody>
+      </p:sp>
+      <p:sp>
+        <p:nvSpPr>
+          <p:cNvPr id="17" name="Oval 16">
+            <a:extLst>
+              <a:ext uri="{FF2B5EF4-FFF2-40B4-BE49-F238E27FC236}">
+                <a16:creationId xmlns:a16="http://schemas.microsoft.com/office/drawing/2014/main" id="{696895A1-6188-5DF3-24CB-E4D115F06282}"/>
+              </a:ext>
+            </a:extLst>
+          </p:cNvPr>
+          <p:cNvSpPr/>
+          <p:nvPr/>
+        </p:nvSpPr>
+        <p:spPr>
+          <a:xfrm>
+            <a:off x="3055114" y="1589770"/>
+            <a:ext cx="3977639" cy="3977639"/>
+          </a:xfrm>
+          <a:prstGeom prst="ellipse">
+            <a:avLst/>
+          </a:prstGeom>
+          <a:noFill/>
+          <a:ln w="50800">
+            <a:solidFill>
+              <a:schemeClr val="tx1"/>
+            </a:solidFill>
+            <a:prstDash val="dash"/>
+          </a:ln>
+        </p:spPr>
+        <p:style>
+          <a:lnRef idx="2">
+            <a:schemeClr val="accent1">
+              <a:shade val="50000"/>
+            </a:schemeClr>
+          </a:lnRef>
+          <a:fillRef idx="1">
+            <a:schemeClr val="accent1"/>
+          </a:fillRef>
+          <a:effectRef idx="0">
+            <a:schemeClr val="accent1"/>
+          </a:effectRef>
+          <a:fontRef idx="minor">
+            <a:schemeClr val="lt1"/>
+          </a:fontRef>
+        </p:style>
+        <p:txBody>
+          <a:bodyPr rtlCol="0" anchor="ctr"/>
+          <a:lstStyle/>
+          <a:p>
+            <a:pPr algn="ctr"/>
+            <a:endParaRPr lang="en-US" sz="2400" dirty="0">
+              <a:solidFill>
+                <a:schemeClr val="tx1"/>
+              </a:solidFill>
+            </a:endParaRPr>
+          </a:p>
+        </p:txBody>
+      </p:sp>
+      <p:sp>
+        <p:nvSpPr>
+          <p:cNvPr id="18" name="TextBox 17">
+            <a:extLst>
+              <a:ext uri="{FF2B5EF4-FFF2-40B4-BE49-F238E27FC236}">
+                <a16:creationId xmlns:a16="http://schemas.microsoft.com/office/drawing/2014/main" id="{DE11376E-FB15-170C-A604-D066A9241E2E}"/>
+              </a:ext>
+            </a:extLst>
+          </p:cNvPr>
+          <p:cNvSpPr txBox="1"/>
+          <p:nvPr/>
+        </p:nvSpPr>
+        <p:spPr>
+          <a:xfrm>
+            <a:off x="1341332" y="639438"/>
+            <a:ext cx="2541658" cy="584775"/>
+          </a:xfrm>
+          <a:prstGeom prst="rect">
+            <a:avLst/>
+          </a:prstGeom>
+          <a:noFill/>
+        </p:spPr>
+        <p:txBody>
+          <a:bodyPr wrap="none" rtlCol="0">
+            <a:spAutoFit/>
+          </a:bodyPr>
+          <a:lstStyle/>
+          <a:p>
+            <a:r>
+              <a:rPr lang="en-US" sz="3200" b="1" dirty="0"/>
+              <a:t>Total 3 – TEXT</a:t>
+            </a:r>
+          </a:p>
+        </p:txBody>
+      </p:sp>
+      <p:cxnSp>
+        <p:nvCxnSpPr>
+          <p:cNvPr id="19" name="Straight Arrow Connector 18">
+            <a:extLst>
+              <a:ext uri="{FF2B5EF4-FFF2-40B4-BE49-F238E27FC236}">
+                <a16:creationId xmlns:a16="http://schemas.microsoft.com/office/drawing/2014/main" id="{4062A6E7-5BCD-1FE0-DE66-BD670A4BE078}"/>
+              </a:ext>
+            </a:extLst>
+          </p:cNvPr>
+          <p:cNvCxnSpPr>
+            <a:cxnSpLocks/>
+            <a:stCxn id="18" idx="2"/>
+            <a:endCxn id="17" idx="1"/>
+          </p:cNvCxnSpPr>
+          <p:nvPr/>
+        </p:nvCxnSpPr>
+        <p:spPr>
+          <a:xfrm>
+            <a:off x="2612161" y="1224213"/>
+            <a:ext cx="1025465" cy="948069"/>
+          </a:xfrm>
+          <a:prstGeom prst="straightConnector1">
+            <a:avLst/>
+          </a:prstGeom>
+          <a:ln w="63500">
+            <a:solidFill>
+              <a:schemeClr val="tx1"/>
+            </a:solidFill>
+            <a:tailEnd type="triangle"/>
+          </a:ln>
+        </p:spPr>
+        <p:style>
+          <a:lnRef idx="1">
+            <a:schemeClr val="accent1"/>
+          </a:lnRef>
+          <a:fillRef idx="0">
+            <a:schemeClr val="accent1"/>
+          </a:fillRef>
+          <a:effectRef idx="0">
+            <a:schemeClr val="accent1"/>
+          </a:effectRef>
+          <a:fontRef idx="minor">
+            <a:schemeClr val="tx1"/>
+          </a:fontRef>
+        </p:style>
+      </p:cxnSp>
+      <p:sp>
+        <p:nvSpPr>
+          <p:cNvPr id="21" name="TextBox 20">
+            <a:extLst>
+              <a:ext uri="{FF2B5EF4-FFF2-40B4-BE49-F238E27FC236}">
+                <a16:creationId xmlns:a16="http://schemas.microsoft.com/office/drawing/2014/main" id="{0E7454BA-B057-3EDB-E9BD-F9FECD496F10}"/>
+              </a:ext>
+            </a:extLst>
+          </p:cNvPr>
+          <p:cNvSpPr txBox="1"/>
+          <p:nvPr/>
+        </p:nvSpPr>
+        <p:spPr>
+          <a:xfrm>
+            <a:off x="8057451" y="1863723"/>
+            <a:ext cx="615874" cy="584775"/>
+          </a:xfrm>
+          <a:prstGeom prst="rect">
+            <a:avLst/>
+          </a:prstGeom>
+          <a:noFill/>
+        </p:spPr>
+        <p:txBody>
+          <a:bodyPr wrap="none" rtlCol="0">
+            <a:spAutoFit/>
+          </a:bodyPr>
+          <a:lstStyle/>
+          <a:p>
+            <a:r>
+              <a:rPr lang="en-US" sz="3200" dirty="0"/>
+              <a:t>R3</a:t>
+            </a:r>
+          </a:p>
+        </p:txBody>
+      </p:sp>
+      <p:cxnSp>
+        <p:nvCxnSpPr>
+          <p:cNvPr id="22" name="Straight Arrow Connector 21">
+            <a:extLst>
+              <a:ext uri="{FF2B5EF4-FFF2-40B4-BE49-F238E27FC236}">
+                <a16:creationId xmlns:a16="http://schemas.microsoft.com/office/drawing/2014/main" id="{D55F9AE6-6CD8-ECE2-B4B9-0569B0DDDCD3}"/>
+              </a:ext>
+            </a:extLst>
+          </p:cNvPr>
+          <p:cNvCxnSpPr>
+            <a:cxnSpLocks/>
+            <a:stCxn id="21" idx="1"/>
+          </p:cNvCxnSpPr>
+          <p:nvPr/>
+        </p:nvCxnSpPr>
+        <p:spPr>
+          <a:xfrm flipH="1">
+            <a:off x="6908563" y="2156111"/>
+            <a:ext cx="1148888" cy="646782"/>
+          </a:xfrm>
+          <a:prstGeom prst="straightConnector1">
+            <a:avLst/>
+          </a:prstGeom>
+          <a:ln w="53975">
+            <a:solidFill>
+              <a:schemeClr val="tx1"/>
+            </a:solidFill>
+            <a:tailEnd type="triangle"/>
+          </a:ln>
+        </p:spPr>
+        <p:style>
+          <a:lnRef idx="1">
+            <a:schemeClr val="accent1"/>
+          </a:lnRef>
+          <a:fillRef idx="0">
+            <a:schemeClr val="accent1"/>
+          </a:fillRef>
+          <a:effectRef idx="0">
+            <a:schemeClr val="accent1"/>
+          </a:effectRef>
+          <a:fontRef idx="minor">
+            <a:schemeClr val="tx1"/>
+          </a:fontRef>
+        </p:style>
+      </p:cxnSp>
+      <p:sp>
+        <p:nvSpPr>
+          <p:cNvPr id="23" name="TextBox 22">
+            <a:extLst>
+              <a:ext uri="{FF2B5EF4-FFF2-40B4-BE49-F238E27FC236}">
+                <a16:creationId xmlns:a16="http://schemas.microsoft.com/office/drawing/2014/main" id="{3124CE09-4883-C8D7-E3E7-DE3E3B8F5BC9}"/>
+              </a:ext>
+            </a:extLst>
+          </p:cNvPr>
+          <p:cNvSpPr txBox="1"/>
+          <p:nvPr/>
+        </p:nvSpPr>
+        <p:spPr>
+          <a:xfrm>
+            <a:off x="4063141" y="177623"/>
+            <a:ext cx="2803588" cy="584775"/>
+          </a:xfrm>
+          <a:prstGeom prst="rect">
+            <a:avLst/>
+          </a:prstGeom>
+          <a:solidFill>
+            <a:schemeClr val="bg1">
+              <a:lumMod val="85000"/>
+              <a:alpha val="80000"/>
+            </a:schemeClr>
+          </a:solidFill>
+        </p:spPr>
+        <p:txBody>
+          <a:bodyPr wrap="none" rtlCol="0">
+            <a:spAutoFit/>
+          </a:bodyPr>
+          <a:lstStyle/>
+          <a:p>
+            <a:pPr algn="ctr"/>
+            <a:r>
+              <a:rPr lang="en-US" sz="3200" dirty="0"/>
+              <a:t>Potential - TEXT</a:t>
+            </a:r>
+          </a:p>
+        </p:txBody>
+      </p:sp>
+      <p:sp>
+        <p:nvSpPr>
+          <p:cNvPr id="24" name="TextBox 23">
+            <a:extLst>
+              <a:ext uri="{FF2B5EF4-FFF2-40B4-BE49-F238E27FC236}">
+                <a16:creationId xmlns:a16="http://schemas.microsoft.com/office/drawing/2014/main" id="{21D269F3-9E8D-E15C-B15E-73380869F1C3}"/>
+              </a:ext>
+            </a:extLst>
+          </p:cNvPr>
+          <p:cNvSpPr txBox="1"/>
+          <p:nvPr/>
+        </p:nvSpPr>
+        <p:spPr>
+          <a:xfrm flipH="1">
+            <a:off x="419099" y="6196382"/>
+            <a:ext cx="3524043" cy="646331"/>
+          </a:xfrm>
+          <a:prstGeom prst="rect">
+            <a:avLst/>
+          </a:prstGeom>
+          <a:noFill/>
+        </p:spPr>
+        <p:txBody>
+          <a:bodyPr wrap="square" rtlCol="0">
+            <a:spAutoFit/>
+          </a:bodyPr>
+          <a:lstStyle/>
+          <a:p>
+            <a:r>
+              <a:rPr lang="en-US" dirty="0">
+                <a:solidFill>
+                  <a:srgbClr val="FF0000"/>
+                </a:solidFill>
+              </a:rPr>
+              <a:t>Legend – Labels </a:t>
+            </a:r>
+            <a:r>
+              <a:rPr lang="en-US">
+                <a:solidFill>
+                  <a:srgbClr val="FF0000"/>
+                </a:solidFill>
+              </a:rPr>
+              <a:t>here matches </a:t>
+            </a:r>
+            <a:r>
+              <a:rPr lang="en-US" dirty="0">
+                <a:solidFill>
+                  <a:srgbClr val="FF0000"/>
+                </a:solidFill>
+              </a:rPr>
+              <a:t>Columns in attached spreadsheet.</a:t>
             </a:r>
           </a:p>
         </p:txBody>

</xml_diff>